<commit_message>
se podria decir que anda
</commit_message>
<xml_diff>
--- a/ctrl/DH.pptx
+++ b/ctrl/DH.pptx
@@ -107,6 +107,11 @@
       </a:defRPr>
     </a:lvl9pPr>
   </p:defaultTextStyle>
+  <p:extLst>
+    <p:ext uri="{EFAFB233-063F-42B5-8137-9DF3F51BA10A}">
+      <p15:sldGuideLst xmlns:p15="http://schemas.microsoft.com/office/powerpoint/2012/main"/>
+    </p:ext>
+  </p:extLst>
 </p:presentation>
 </file>
 
@@ -192,7 +197,7 @@
           <a:p>
             <a:fld id="{C95991D3-C6B8-4446-BB73-FCAA80516EFD}" type="datetimeFigureOut">
               <a:rPr lang="es-AR" smtClean="0"/>
-              <a:t>12/12/2020</a:t>
+              <a:t>29/12/2020</a:t>
             </a:fld>
             <a:endParaRPr lang="es-AR"/>
           </a:p>
@@ -351,7 +356,7 @@
           <a:p>
             <a:fld id="{87B926BC-71A8-43C6-A4DD-8E7B7044D716}" type="slidenum">
               <a:rPr lang="es-AR" smtClean="0"/>
-              <a:t>‹Nº›</a:t>
+              <a:t>‹#›</a:t>
             </a:fld>
             <a:endParaRPr lang="es-AR"/>
           </a:p>
@@ -609,7 +614,7 @@
           <a:p>
             <a:fld id="{5C2E1DD8-F539-4E30-8CE7-FF26A0CBCF1C}" type="datetimeFigureOut">
               <a:rPr lang="es-AR" smtClean="0"/>
-              <a:t>12/12/2020</a:t>
+              <a:t>29/12/2020</a:t>
             </a:fld>
             <a:endParaRPr lang="es-AR"/>
           </a:p>
@@ -663,7 +668,7 @@
           <a:p>
             <a:fld id="{8541E104-08D6-46BC-89C8-0A86C620F1C7}" type="slidenum">
               <a:rPr lang="es-AR" smtClean="0"/>
-              <a:t>‹Nº›</a:t>
+              <a:t>‹#›</a:t>
             </a:fld>
             <a:endParaRPr lang="es-AR"/>
           </a:p>
@@ -809,7 +814,7 @@
           <a:p>
             <a:fld id="{5C2E1DD8-F539-4E30-8CE7-FF26A0CBCF1C}" type="datetimeFigureOut">
               <a:rPr lang="es-AR" smtClean="0"/>
-              <a:t>12/12/2020</a:t>
+              <a:t>29/12/2020</a:t>
             </a:fld>
             <a:endParaRPr lang="es-AR"/>
           </a:p>
@@ -863,7 +868,7 @@
           <a:p>
             <a:fld id="{8541E104-08D6-46BC-89C8-0A86C620F1C7}" type="slidenum">
               <a:rPr lang="es-AR" smtClean="0"/>
-              <a:t>‹Nº›</a:t>
+              <a:t>‹#›</a:t>
             </a:fld>
             <a:endParaRPr lang="es-AR"/>
           </a:p>
@@ -1019,7 +1024,7 @@
           <a:p>
             <a:fld id="{5C2E1DD8-F539-4E30-8CE7-FF26A0CBCF1C}" type="datetimeFigureOut">
               <a:rPr lang="es-AR" smtClean="0"/>
-              <a:t>12/12/2020</a:t>
+              <a:t>29/12/2020</a:t>
             </a:fld>
             <a:endParaRPr lang="es-AR"/>
           </a:p>
@@ -1073,7 +1078,7 @@
           <a:p>
             <a:fld id="{8541E104-08D6-46BC-89C8-0A86C620F1C7}" type="slidenum">
               <a:rPr lang="es-AR" smtClean="0"/>
-              <a:t>‹Nº›</a:t>
+              <a:t>‹#›</a:t>
             </a:fld>
             <a:endParaRPr lang="es-AR"/>
           </a:p>
@@ -1219,7 +1224,7 @@
           <a:p>
             <a:fld id="{5C2E1DD8-F539-4E30-8CE7-FF26A0CBCF1C}" type="datetimeFigureOut">
               <a:rPr lang="es-AR" smtClean="0"/>
-              <a:t>12/12/2020</a:t>
+              <a:t>29/12/2020</a:t>
             </a:fld>
             <a:endParaRPr lang="es-AR"/>
           </a:p>
@@ -1273,7 +1278,7 @@
           <a:p>
             <a:fld id="{8541E104-08D6-46BC-89C8-0A86C620F1C7}" type="slidenum">
               <a:rPr lang="es-AR" smtClean="0"/>
-              <a:t>‹Nº›</a:t>
+              <a:t>‹#›</a:t>
             </a:fld>
             <a:endParaRPr lang="es-AR"/>
           </a:p>
@@ -1495,7 +1500,7 @@
           <a:p>
             <a:fld id="{5C2E1DD8-F539-4E30-8CE7-FF26A0CBCF1C}" type="datetimeFigureOut">
               <a:rPr lang="es-AR" smtClean="0"/>
-              <a:t>12/12/2020</a:t>
+              <a:t>29/12/2020</a:t>
             </a:fld>
             <a:endParaRPr lang="es-AR"/>
           </a:p>
@@ -1549,7 +1554,7 @@
           <a:p>
             <a:fld id="{8541E104-08D6-46BC-89C8-0A86C620F1C7}" type="slidenum">
               <a:rPr lang="es-AR" smtClean="0"/>
-              <a:t>‹Nº›</a:t>
+              <a:t>‹#›</a:t>
             </a:fld>
             <a:endParaRPr lang="es-AR"/>
           </a:p>
@@ -1763,7 +1768,7 @@
           <a:p>
             <a:fld id="{5C2E1DD8-F539-4E30-8CE7-FF26A0CBCF1C}" type="datetimeFigureOut">
               <a:rPr lang="es-AR" smtClean="0"/>
-              <a:t>12/12/2020</a:t>
+              <a:t>29/12/2020</a:t>
             </a:fld>
             <a:endParaRPr lang="es-AR"/>
           </a:p>
@@ -1817,7 +1822,7 @@
           <a:p>
             <a:fld id="{8541E104-08D6-46BC-89C8-0A86C620F1C7}" type="slidenum">
               <a:rPr lang="es-AR" smtClean="0"/>
-              <a:t>‹Nº›</a:t>
+              <a:t>‹#›</a:t>
             </a:fld>
             <a:endParaRPr lang="es-AR"/>
           </a:p>
@@ -2178,7 +2183,7 @@
           <a:p>
             <a:fld id="{5C2E1DD8-F539-4E30-8CE7-FF26A0CBCF1C}" type="datetimeFigureOut">
               <a:rPr lang="es-AR" smtClean="0"/>
-              <a:t>12/12/2020</a:t>
+              <a:t>29/12/2020</a:t>
             </a:fld>
             <a:endParaRPr lang="es-AR"/>
           </a:p>
@@ -2232,7 +2237,7 @@
           <a:p>
             <a:fld id="{8541E104-08D6-46BC-89C8-0A86C620F1C7}" type="slidenum">
               <a:rPr lang="es-AR" smtClean="0"/>
-              <a:t>‹Nº›</a:t>
+              <a:t>‹#›</a:t>
             </a:fld>
             <a:endParaRPr lang="es-AR"/>
           </a:p>
@@ -2320,7 +2325,7 @@
           <a:p>
             <a:fld id="{5C2E1DD8-F539-4E30-8CE7-FF26A0CBCF1C}" type="datetimeFigureOut">
               <a:rPr lang="es-AR" smtClean="0"/>
-              <a:t>12/12/2020</a:t>
+              <a:t>29/12/2020</a:t>
             </a:fld>
             <a:endParaRPr lang="es-AR"/>
           </a:p>
@@ -2374,7 +2379,7 @@
           <a:p>
             <a:fld id="{8541E104-08D6-46BC-89C8-0A86C620F1C7}" type="slidenum">
               <a:rPr lang="es-AR" smtClean="0"/>
-              <a:t>‹Nº›</a:t>
+              <a:t>‹#›</a:t>
             </a:fld>
             <a:endParaRPr lang="es-AR"/>
           </a:p>
@@ -2433,7 +2438,7 @@
           <a:p>
             <a:fld id="{5C2E1DD8-F539-4E30-8CE7-FF26A0CBCF1C}" type="datetimeFigureOut">
               <a:rPr lang="es-AR" smtClean="0"/>
-              <a:t>12/12/2020</a:t>
+              <a:t>29/12/2020</a:t>
             </a:fld>
             <a:endParaRPr lang="es-AR"/>
           </a:p>
@@ -2487,7 +2492,7 @@
           <a:p>
             <a:fld id="{8541E104-08D6-46BC-89C8-0A86C620F1C7}" type="slidenum">
               <a:rPr lang="es-AR" smtClean="0"/>
-              <a:t>‹Nº›</a:t>
+              <a:t>‹#›</a:t>
             </a:fld>
             <a:endParaRPr lang="es-AR"/>
           </a:p>
@@ -2746,7 +2751,7 @@
           <a:p>
             <a:fld id="{5C2E1DD8-F539-4E30-8CE7-FF26A0CBCF1C}" type="datetimeFigureOut">
               <a:rPr lang="es-AR" smtClean="0"/>
-              <a:t>12/12/2020</a:t>
+              <a:t>29/12/2020</a:t>
             </a:fld>
             <a:endParaRPr lang="es-AR"/>
           </a:p>
@@ -2800,7 +2805,7 @@
           <a:p>
             <a:fld id="{8541E104-08D6-46BC-89C8-0A86C620F1C7}" type="slidenum">
               <a:rPr lang="es-AR" smtClean="0"/>
-              <a:t>‹Nº›</a:t>
+              <a:t>‹#›</a:t>
             </a:fld>
             <a:endParaRPr lang="es-AR"/>
           </a:p>
@@ -3035,7 +3040,7 @@
           <a:p>
             <a:fld id="{5C2E1DD8-F539-4E30-8CE7-FF26A0CBCF1C}" type="datetimeFigureOut">
               <a:rPr lang="es-AR" smtClean="0"/>
-              <a:t>12/12/2020</a:t>
+              <a:t>29/12/2020</a:t>
             </a:fld>
             <a:endParaRPr lang="es-AR"/>
           </a:p>
@@ -3089,7 +3094,7 @@
           <a:p>
             <a:fld id="{8541E104-08D6-46BC-89C8-0A86C620F1C7}" type="slidenum">
               <a:rPr lang="es-AR" smtClean="0"/>
-              <a:t>‹Nº›</a:t>
+              <a:t>‹#›</a:t>
             </a:fld>
             <a:endParaRPr lang="es-AR"/>
           </a:p>
@@ -3278,7 +3283,7 @@
           <a:p>
             <a:fld id="{5C2E1DD8-F539-4E30-8CE7-FF26A0CBCF1C}" type="datetimeFigureOut">
               <a:rPr lang="es-AR" smtClean="0"/>
-              <a:t>12/12/2020</a:t>
+              <a:t>29/12/2020</a:t>
             </a:fld>
             <a:endParaRPr lang="es-AR"/>
           </a:p>
@@ -3368,7 +3373,7 @@
           <a:p>
             <a:fld id="{8541E104-08D6-46BC-89C8-0A86C620F1C7}" type="slidenum">
               <a:rPr lang="es-AR" smtClean="0"/>
-              <a:t>‹Nº›</a:t>
+              <a:t>‹#›</a:t>
             </a:fld>
             <a:endParaRPr lang="es-AR"/>
           </a:p>
@@ -4935,8 +4940,8 @@
           </a:p>
         </p:txBody>
       </p:sp>
-      <mc:AlternateContent xmlns:mc="http://schemas.openxmlformats.org/markup-compatibility/2006">
-        <mc:Choice xmlns:a14="http://schemas.microsoft.com/office/drawing/2010/main" Requires="a14">
+      <mc:AlternateContent xmlns:mc="http://schemas.openxmlformats.org/markup-compatibility/2006" xmlns:a14="http://schemas.microsoft.com/office/drawing/2010/main">
+        <mc:Choice Requires="a14">
           <p:graphicFrame>
             <p:nvGraphicFramePr>
               <p:cNvPr id="59" name="Tabla 59">
@@ -5603,7 +5608,7 @@
             </a:graphic>
           </p:graphicFrame>
         </mc:Choice>
-        <mc:Fallback>
+        <mc:Fallback xmlns="">
           <p:graphicFrame>
             <p:nvGraphicFramePr>
               <p:cNvPr id="59" name="Tabla 59">

</xml_diff>